<commit_message>
PPTs JSON JAVA Integrada
</commit_message>
<xml_diff>
--- a/01 Classes/Aula 10 Programação Python - Arquivos e JSON.pptx
+++ b/01 Classes/Aula 10 Programação Python - Arquivos e JSON.pptx
@@ -2318,7 +2318,7 @@
           <a:p>
             <a:fld id="{48A87A34-81AB-432B-8DAE-1953F412C126}" type="datetimeFigureOut">
               <a:rPr lang="en-US" smtClean="0"/>
-              <a:t>5/14/2022</a:t>
+              <a:t>5/23/2022</a:t>
             </a:fld>
             <a:endParaRPr lang="en-US" dirty="0"/>
           </a:p>
@@ -2529,7 +2529,7 @@
           <a:p>
             <a:fld id="{48A87A34-81AB-432B-8DAE-1953F412C126}" type="datetimeFigureOut">
               <a:rPr lang="en-US" smtClean="0"/>
-              <a:t>5/14/2022</a:t>
+              <a:t>5/23/2022</a:t>
             </a:fld>
             <a:endParaRPr lang="en-US" dirty="0"/>
           </a:p>
@@ -2744,7 +2744,7 @@
           <a:p>
             <a:fld id="{48A87A34-81AB-432B-8DAE-1953F412C126}" type="datetimeFigureOut">
               <a:rPr lang="en-US" smtClean="0"/>
-              <a:t>5/14/2022</a:t>
+              <a:t>5/23/2022</a:t>
             </a:fld>
             <a:endParaRPr lang="en-US" dirty="0"/>
           </a:p>
@@ -3112,7 +3112,7 @@
           <a:p>
             <a:fld id="{48A87A34-81AB-432B-8DAE-1953F412C126}" type="datetimeFigureOut">
               <a:rPr lang="en-US" smtClean="0"/>
-              <a:t>5/14/2022</a:t>
+              <a:t>5/23/2022</a:t>
             </a:fld>
             <a:endParaRPr lang="en-US" dirty="0"/>
           </a:p>
@@ -3391,7 +3391,7 @@
           <a:p>
             <a:fld id="{48A87A34-81AB-432B-8DAE-1953F412C126}" type="datetimeFigureOut">
               <a:rPr lang="en-US" smtClean="0"/>
-              <a:t>5/14/2022</a:t>
+              <a:t>5/23/2022</a:t>
             </a:fld>
             <a:endParaRPr lang="en-US" dirty="0"/>
           </a:p>
@@ -3659,7 +3659,7 @@
           <a:p>
             <a:fld id="{48A87A34-81AB-432B-8DAE-1953F412C126}" type="datetimeFigureOut">
               <a:rPr lang="en-US" smtClean="0"/>
-              <a:t>5/14/2022</a:t>
+              <a:t>5/23/2022</a:t>
             </a:fld>
             <a:endParaRPr lang="en-US" dirty="0"/>
           </a:p>
@@ -4075,7 +4075,7 @@
           <a:p>
             <a:fld id="{48A87A34-81AB-432B-8DAE-1953F412C126}" type="datetimeFigureOut">
               <a:rPr lang="en-US" smtClean="0"/>
-              <a:t>5/14/2022</a:t>
+              <a:t>5/23/2022</a:t>
             </a:fld>
             <a:endParaRPr lang="en-US" dirty="0"/>
           </a:p>
@@ -4224,7 +4224,7 @@
           <a:p>
             <a:fld id="{48A87A34-81AB-432B-8DAE-1953F412C126}" type="datetimeFigureOut">
               <a:rPr lang="en-US" smtClean="0"/>
-              <a:t>5/14/2022</a:t>
+              <a:t>5/23/2022</a:t>
             </a:fld>
             <a:endParaRPr lang="en-US" dirty="0"/>
           </a:p>
@@ -4350,7 +4350,7 @@
           <a:p>
             <a:fld id="{48A87A34-81AB-432B-8DAE-1953F412C126}" type="datetimeFigureOut">
               <a:rPr lang="en-US" smtClean="0"/>
-              <a:t>5/14/2022</a:t>
+              <a:t>5/23/2022</a:t>
             </a:fld>
             <a:endParaRPr lang="en-US" dirty="0"/>
           </a:p>
@@ -4601,7 +4601,7 @@
           <a:p>
             <a:fld id="{48A87A34-81AB-432B-8DAE-1953F412C126}" type="datetimeFigureOut">
               <a:rPr lang="en-US" smtClean="0"/>
-              <a:t>5/14/2022</a:t>
+              <a:t>5/23/2022</a:t>
             </a:fld>
             <a:endParaRPr lang="en-US" dirty="0"/>
           </a:p>
@@ -5047,7 +5047,7 @@
             <a:fld id="{48A87A34-81AB-432B-8DAE-1953F412C126}" type="datetimeFigureOut">
               <a:rPr lang="en-US" smtClean="0"/>
               <a:pPr/>
-              <a:t>5/14/2022</a:t>
+              <a:t>5/23/2022</a:t>
             </a:fld>
             <a:endParaRPr lang="en-US" dirty="0"/>
           </a:p>
@@ -5375,7 +5375,7 @@
             <a:fld id="{48A87A34-81AB-432B-8DAE-1953F412C126}" type="datetimeFigureOut">
               <a:rPr lang="en-US" smtClean="0"/>
               <a:pPr/>
-              <a:t>5/14/2022</a:t>
+              <a:t>5/23/2022</a:t>
             </a:fld>
             <a:endParaRPr lang="en-US" dirty="0"/>
           </a:p>
@@ -7884,7 +7884,21 @@
                 <a:latin typeface="Times New Roman" panose="02020603050405020304" pitchFamily="18" charset="0"/>
                 <a:cs typeface="Times New Roman" panose="02020603050405020304" pitchFamily="18" charset="0"/>
               </a:rPr>
-              <a:t> - Abre um arquivo p/ anexação, cria o </a:t>
+              <a:t> - Abre um arquivo p/ anexação, </a:t>
+            </a:r>
+            <a:r>
+              <a:rPr lang="pt-BR" sz="2400" b="1" dirty="0">
+                <a:latin typeface="Times New Roman" panose="02020603050405020304" pitchFamily="18" charset="0"/>
+                <a:cs typeface="Times New Roman" panose="02020603050405020304" pitchFamily="18" charset="0"/>
+              </a:rPr>
+              <a:t>cria</a:t>
+            </a:r>
+            <a:r>
+              <a:rPr lang="pt-BR" sz="2400" dirty="0">
+                <a:latin typeface="Times New Roman" panose="02020603050405020304" pitchFamily="18" charset="0"/>
+                <a:cs typeface="Times New Roman" panose="02020603050405020304" pitchFamily="18" charset="0"/>
+              </a:rPr>
+              <a:t> o </a:t>
             </a:r>
             <a:r>
               <a:rPr lang="pt-BR" sz="2400" dirty="0" err="1">
@@ -7898,7 +7912,14 @@
                 <a:latin typeface="Times New Roman" panose="02020603050405020304" pitchFamily="18" charset="0"/>
                 <a:cs typeface="Times New Roman" panose="02020603050405020304" pitchFamily="18" charset="0"/>
               </a:rPr>
-              <a:t> se não existir</a:t>
+              <a:t> </a:t>
+            </a:r>
+            <a:r>
+              <a:rPr lang="pt-BR" sz="2400" b="1" dirty="0">
+                <a:latin typeface="Times New Roman" panose="02020603050405020304" pitchFamily="18" charset="0"/>
+                <a:cs typeface="Times New Roman" panose="02020603050405020304" pitchFamily="18" charset="0"/>
+              </a:rPr>
+              <a:t>se não existir</a:t>
             </a:r>
           </a:p>
           <a:p>
@@ -7924,7 +7945,21 @@
                 <a:latin typeface="Times New Roman" panose="02020603050405020304" pitchFamily="18" charset="0"/>
                 <a:cs typeface="Times New Roman" panose="02020603050405020304" pitchFamily="18" charset="0"/>
               </a:rPr>
-              <a:t> - Abre um arquivo p/ escrita, cria o </a:t>
+              <a:t> - Abre um arquivo p/ escrita, </a:t>
+            </a:r>
+            <a:r>
+              <a:rPr lang="pt-BR" sz="2400" b="1" dirty="0">
+                <a:latin typeface="Times New Roman" panose="02020603050405020304" pitchFamily="18" charset="0"/>
+                <a:cs typeface="Times New Roman" panose="02020603050405020304" pitchFamily="18" charset="0"/>
+              </a:rPr>
+              <a:t>cria </a:t>
+            </a:r>
+            <a:r>
+              <a:rPr lang="pt-BR" sz="2400" dirty="0">
+                <a:latin typeface="Times New Roman" panose="02020603050405020304" pitchFamily="18" charset="0"/>
+                <a:cs typeface="Times New Roman" panose="02020603050405020304" pitchFamily="18" charset="0"/>
+              </a:rPr>
+              <a:t>o </a:t>
             </a:r>
             <a:r>
               <a:rPr lang="pt-BR" sz="2400" dirty="0" err="1">
@@ -7934,11 +7969,35 @@
               <a:t>arq</a:t>
             </a:r>
             <a:r>
+              <a:rPr lang="pt-BR" sz="2400" b="1" dirty="0">
+                <a:latin typeface="Times New Roman" panose="02020603050405020304" pitchFamily="18" charset="0"/>
+                <a:cs typeface="Times New Roman" panose="02020603050405020304" pitchFamily="18" charset="0"/>
+              </a:rPr>
+              <a:t> caso não exista</a:t>
+            </a:r>
+            <a:r>
               <a:rPr lang="pt-BR" sz="2400" dirty="0">
                 <a:latin typeface="Times New Roman" panose="02020603050405020304" pitchFamily="18" charset="0"/>
                 <a:cs typeface="Times New Roman" panose="02020603050405020304" pitchFamily="18" charset="0"/>
               </a:rPr>
-              <a:t> caso não exista</a:t>
+              <a:t>, e </a:t>
+            </a:r>
+            <a:r>
+              <a:rPr lang="pt-BR" sz="2400" b="1" dirty="0">
+                <a:solidFill>
+                  <a:srgbClr val="FF0000"/>
+                </a:solidFill>
+                <a:latin typeface="Times New Roman" panose="02020603050405020304" pitchFamily="18" charset="0"/>
+                <a:cs typeface="Times New Roman" panose="02020603050405020304" pitchFamily="18" charset="0"/>
+              </a:rPr>
+              <a:t>caso exista sobrepõe o arquivo</a:t>
+            </a:r>
+            <a:r>
+              <a:rPr lang="pt-BR" sz="2400" dirty="0">
+                <a:latin typeface="Times New Roman" panose="02020603050405020304" pitchFamily="18" charset="0"/>
+                <a:cs typeface="Times New Roman" panose="02020603050405020304" pitchFamily="18" charset="0"/>
+              </a:rPr>
+              <a:t>.</a:t>
             </a:r>
           </a:p>
           <a:p>
@@ -12928,7 +12987,7 @@
                 <a:latin typeface="Times New Roman" panose="02020603050405020304" pitchFamily="18" charset="0"/>
                 <a:cs typeface="Times New Roman" panose="02020603050405020304" pitchFamily="18" charset="0"/>
               </a:rPr>
-              <a:t>impot</a:t>
+              <a:t>import</a:t>
             </a:r>
             <a:r>
               <a:rPr lang="pt-BR" sz="2400" dirty="0">

</xml_diff>